<commit_message>
Ruijiao is back, we added a code base for ScatterVolume
</commit_message>
<xml_diff>
--- a/docs/scatterlayer.pptx
+++ b/docs/scatterlayer.pptx
@@ -249,7 +249,7 @@
           <a:p>
             <a:fld id="{95BD1005-BDC6-4327-A8E1-8568F6EDDE07}" type="datetimeFigureOut">
               <a:rPr lang="en-US" smtClean="0"/>
-              <a:t>7/22/2022</a:t>
+              <a:t>8/23/2022</a:t>
             </a:fld>
             <a:endParaRPr lang="en-US"/>
           </a:p>
@@ -451,7 +451,7 @@
           <a:p>
             <a:fld id="{95BD1005-BDC6-4327-A8E1-8568F6EDDE07}" type="datetimeFigureOut">
               <a:rPr lang="en-US" smtClean="0"/>
-              <a:t>7/22/2022</a:t>
+              <a:t>8/23/2022</a:t>
             </a:fld>
             <a:endParaRPr lang="en-US"/>
           </a:p>
@@ -619,7 +619,7 @@
           <a:p>
             <a:fld id="{95BD1005-BDC6-4327-A8E1-8568F6EDDE07}" type="datetimeFigureOut">
               <a:rPr lang="en-US" smtClean="0"/>
-              <a:t>7/22/2022</a:t>
+              <a:t>8/23/2022</a:t>
             </a:fld>
             <a:endParaRPr lang="en-US"/>
           </a:p>
@@ -862,7 +862,7 @@
           <a:p>
             <a:fld id="{95BD1005-BDC6-4327-A8E1-8568F6EDDE07}" type="datetimeFigureOut">
               <a:rPr lang="en-US" smtClean="0"/>
-              <a:t>7/22/2022</a:t>
+              <a:t>8/23/2022</a:t>
             </a:fld>
             <a:endParaRPr lang="en-US"/>
           </a:p>
@@ -1091,7 +1091,7 @@
           <a:p>
             <a:fld id="{95BD1005-BDC6-4327-A8E1-8568F6EDDE07}" type="datetimeFigureOut">
               <a:rPr lang="en-US" smtClean="0"/>
-              <a:t>7/22/2022</a:t>
+              <a:t>8/23/2022</a:t>
             </a:fld>
             <a:endParaRPr lang="en-US"/>
           </a:p>
@@ -1208,7 +1208,7 @@
           <a:p>
             <a:fld id="{95BD1005-BDC6-4327-A8E1-8568F6EDDE07}" type="datetimeFigureOut">
               <a:rPr lang="en-US" smtClean="0"/>
-              <a:t>7/22/2022</a:t>
+              <a:t>8/23/2022</a:t>
             </a:fld>
             <a:endParaRPr lang="en-US"/>
           </a:p>
@@ -1303,7 +1303,7 @@
           <a:p>
             <a:fld id="{95BD1005-BDC6-4327-A8E1-8568F6EDDE07}" type="datetimeFigureOut">
               <a:rPr lang="en-US" smtClean="0"/>
-              <a:t>7/22/2022</a:t>
+              <a:t>8/23/2022</a:t>
             </a:fld>
             <a:endParaRPr lang="en-US"/>
           </a:p>
@@ -1578,7 +1578,7 @@
           <a:p>
             <a:fld id="{95BD1005-BDC6-4327-A8E1-8568F6EDDE07}" type="datetimeFigureOut">
               <a:rPr lang="en-US" smtClean="0"/>
-              <a:t>7/22/2022</a:t>
+              <a:t>8/23/2022</a:t>
             </a:fld>
             <a:endParaRPr lang="en-US"/>
           </a:p>
@@ -1830,7 +1830,7 @@
           <a:p>
             <a:fld id="{95BD1005-BDC6-4327-A8E1-8568F6EDDE07}" type="datetimeFigureOut">
               <a:rPr lang="en-US" smtClean="0"/>
-              <a:t>7/22/2022</a:t>
+              <a:t>8/23/2022</a:t>
             </a:fld>
             <a:endParaRPr lang="en-US"/>
           </a:p>
@@ -1998,7 +1998,7 @@
           <a:p>
             <a:fld id="{95BD1005-BDC6-4327-A8E1-8568F6EDDE07}" type="datetimeFigureOut">
               <a:rPr lang="en-US" smtClean="0"/>
-              <a:t>7/22/2022</a:t>
+              <a:t>8/23/2022</a:t>
             </a:fld>
             <a:endParaRPr lang="en-US"/>
           </a:p>
@@ -2211,7 +2211,7 @@
             <a:fld id="{95BD1005-BDC6-4327-A8E1-8568F6EDDE07}" type="datetimeFigureOut">
               <a:rPr lang="en-US" smtClean="0"/>
               <a:pPr/>
-              <a:t>7/22/2022</a:t>
+              <a:t>8/23/2022</a:t>
             </a:fld>
             <a:endParaRPr lang="en-US"/>
           </a:p>
@@ -3883,8 +3883,8 @@
           <a:chExt cx="0" cy="0"/>
         </a:xfrm>
       </p:grpSpPr>
-      <mc:AlternateContent xmlns:mc="http://schemas.openxmlformats.org/markup-compatibility/2006" xmlns:a14="http://schemas.microsoft.com/office/drawing/2010/main">
-        <mc:Choice Requires="a14">
+      <mc:AlternateContent xmlns:mc="http://schemas.openxmlformats.org/markup-compatibility/2006">
+        <mc:Choice xmlns:a14="http://schemas.microsoft.com/office/drawing/2010/main" Requires="a14">
           <p:sp>
             <p:nvSpPr>
               <p:cNvPr id="2" name="Title 1">
@@ -3908,7 +3908,7 @@
               <a:p>
                 <a:r>
                   <a:rPr lang="en-US" dirty="0"/>
-                  <a:t>Gauss’ Constraints </a:t>
+                  <a:t>Gauss’ Constraints – </a:t>
                 </a:r>
                 <a14:m>
                   <m:oMath xmlns:m="http://schemas.openxmlformats.org/officeDocument/2006/math">
@@ -3916,7 +3916,7 @@
                       <a:rPr lang="en-US" b="0" i="1" smtClean="0">
                         <a:latin typeface="Cambria Math" panose="02040503050406030204" pitchFamily="18" charset="0"/>
                       </a:rPr>
-                      <m:t>(2</m:t>
+                      <m:t>2(</m:t>
                     </m:r>
                     <m:r>
                       <a:rPr lang="en-US" b="0" i="1" smtClean="0">
@@ -3928,7 +3928,7 @@
                       <a:rPr lang="en-US" b="0" i="1" smtClean="0">
                         <a:latin typeface="Cambria Math" panose="02040503050406030204" pitchFamily="18" charset="0"/>
                       </a:rPr>
-                      <m:t>)</m:t>
+                      <m:t>−1)</m:t>
                     </m:r>
                   </m:oMath>
                 </a14:m>
@@ -3937,7 +3937,7 @@
             </p:txBody>
           </p:sp>
         </mc:Choice>
-        <mc:Fallback xmlns="">
+        <mc:Fallback>
           <p:sp>
             <p:nvSpPr>
               <p:cNvPr id="2" name="Title 1">
@@ -5076,34 +5076,103 @@
           <a:chExt cx="0" cy="0"/>
         </a:xfrm>
       </p:grpSpPr>
-      <p:sp>
-        <p:nvSpPr>
-          <p:cNvPr id="2" name="Title 1">
-            <a:extLst>
-              <a:ext uri="{FF2B5EF4-FFF2-40B4-BE49-F238E27FC236}">
-                <a16:creationId xmlns:a16="http://schemas.microsoft.com/office/drawing/2014/main" id="{B9F4C41A-B242-468E-A360-146E05A23947}"/>
-              </a:ext>
-            </a:extLst>
-          </p:cNvPr>
-          <p:cNvSpPr>
-            <a:spLocks noGrp="1"/>
-          </p:cNvSpPr>
-          <p:nvPr>
-            <p:ph type="title"/>
-          </p:nvPr>
-        </p:nvSpPr>
-        <p:spPr/>
-        <p:txBody>
-          <a:bodyPr/>
-          <a:lstStyle/>
-          <a:p>
-            <a:r>
-              <a:rPr lang="en-US" dirty="0"/>
-              <a:t>Transverse Constraints</a:t>
-            </a:r>
-          </a:p>
-        </p:txBody>
-      </p:sp>
+      <mc:AlternateContent xmlns:mc="http://schemas.openxmlformats.org/markup-compatibility/2006">
+        <mc:Choice xmlns:a14="http://schemas.microsoft.com/office/drawing/2010/main" Requires="a14">
+          <p:sp>
+            <p:nvSpPr>
+              <p:cNvPr id="2" name="Title 1">
+                <a:extLst>
+                  <a:ext uri="{FF2B5EF4-FFF2-40B4-BE49-F238E27FC236}">
+                    <a16:creationId xmlns:a16="http://schemas.microsoft.com/office/drawing/2014/main" id="{B9F4C41A-B242-468E-A360-146E05A23947}"/>
+                  </a:ext>
+                </a:extLst>
+              </p:cNvPr>
+              <p:cNvSpPr>
+                <a:spLocks noGrp="1"/>
+              </p:cNvSpPr>
+              <p:nvPr>
+                <p:ph type="title"/>
+              </p:nvPr>
+            </p:nvSpPr>
+            <p:spPr/>
+            <p:txBody>
+              <a:bodyPr/>
+              <a:lstStyle/>
+              <a:p>
+                <a:r>
+                  <a:rPr lang="en-US" dirty="0"/>
+                  <a:t>Boundary Conditions – </a:t>
+                </a:r>
+                <a14:m>
+                  <m:oMath xmlns:m="http://schemas.openxmlformats.org/officeDocument/2006/math">
+                    <m:r>
+                      <a:rPr lang="en-US" b="0" i="1" smtClean="0">
+                        <a:latin typeface="Cambria Math" panose="02040503050406030204" pitchFamily="18" charset="0"/>
+                      </a:rPr>
+                      <m:t>4(</m:t>
+                    </m:r>
+                    <m:r>
+                      <a:rPr lang="en-US" b="0" i="1" smtClean="0">
+                        <a:latin typeface="Cambria Math" panose="02040503050406030204" pitchFamily="18" charset="0"/>
+                      </a:rPr>
+                      <m:t>𝐿</m:t>
+                    </m:r>
+                    <m:r>
+                      <a:rPr lang="en-US" b="0" i="1" smtClean="0">
+                        <a:latin typeface="Cambria Math" panose="02040503050406030204" pitchFamily="18" charset="0"/>
+                      </a:rPr>
+                      <m:t>−1)</m:t>
+                    </m:r>
+                  </m:oMath>
+                </a14:m>
+                <a:r>
+                  <a:rPr lang="en-US" dirty="0"/>
+                  <a:t> </a:t>
+                </a:r>
+              </a:p>
+            </p:txBody>
+          </p:sp>
+        </mc:Choice>
+        <mc:Fallback>
+          <p:sp>
+            <p:nvSpPr>
+              <p:cNvPr id="2" name="Title 1">
+                <a:extLst>
+                  <a:ext uri="{FF2B5EF4-FFF2-40B4-BE49-F238E27FC236}">
+                    <a16:creationId xmlns:a16="http://schemas.microsoft.com/office/drawing/2014/main" id="{B9F4C41A-B242-468E-A360-146E05A23947}"/>
+                  </a:ext>
+                </a:extLst>
+              </p:cNvPr>
+              <p:cNvSpPr>
+                <a:spLocks noGrp="1" noRot="1" noChangeAspect="1" noMove="1" noResize="1" noEditPoints="1" noAdjustHandles="1" noChangeArrowheads="1" noChangeShapeType="1" noTextEdit="1"/>
+              </p:cNvSpPr>
+              <p:nvPr>
+                <p:ph type="title"/>
+              </p:nvPr>
+            </p:nvSpPr>
+            <p:spPr>
+              <a:blipFill>
+                <a:blip r:embed="rId2"/>
+                <a:stretch>
+                  <a:fillRect l="-2377" t="-10959" b="-21918"/>
+                </a:stretch>
+              </a:blipFill>
+            </p:spPr>
+            <p:txBody>
+              <a:bodyPr/>
+              <a:lstStyle/>
+              <a:p>
+                <a:r>
+                  <a:rPr lang="en-US">
+                    <a:noFill/>
+                  </a:rPr>
+                  <a:t> </a:t>
+                </a:r>
+              </a:p>
+            </p:txBody>
+          </p:sp>
+        </mc:Fallback>
+      </mc:AlternateContent>
       <mc:AlternateContent xmlns:mc="http://schemas.openxmlformats.org/markup-compatibility/2006" xmlns:a14="http://schemas.microsoft.com/office/drawing/2010/main">
         <mc:Choice Requires="a14">
           <p:sp>
@@ -11035,7 +11104,7 @@
                 <a:ext cx="11191875" cy="5054219"/>
               </a:xfrm>
               <a:blipFill>
-                <a:blip r:embed="rId2"/>
+                <a:blip r:embed="rId3"/>
                 <a:stretch>
                   <a:fillRect l="-708" t="-2292"/>
                 </a:stretch>
@@ -16988,10 +17057,7 @@
                                 <m:r>
                                   <a:rPr lang="en-US" sz="1600" b="0" i="1" smtClean="0">
                                     <a:solidFill>
-                                      <a:schemeClr val="bg2">
-                                        <a:lumMod val="60000"/>
-                                        <a:lumOff val="40000"/>
-                                      </a:schemeClr>
+                                      <a:schemeClr val="bg1"/>
                                     </a:solidFill>
                                     <a:latin typeface="Cambria Math" panose="02040503050406030204" pitchFamily="18" charset="0"/>
                                   </a:rPr>
@@ -17004,10 +17070,7 @@
                                 <m:r>
                                   <a:rPr lang="en-US" sz="1600" b="0" i="1" smtClean="0">
                                     <a:solidFill>
-                                      <a:schemeClr val="bg2">
-                                        <a:lumMod val="60000"/>
-                                        <a:lumOff val="40000"/>
-                                      </a:schemeClr>
+                                      <a:schemeClr val="bg1"/>
                                     </a:solidFill>
                                     <a:latin typeface="Cambria Math" panose="02040503050406030204" pitchFamily="18" charset="0"/>
                                   </a:rPr>
@@ -17166,6 +17229,169 @@
           </p:sp>
         </mc:Fallback>
       </mc:AlternateContent>
+      <p:sp>
+        <p:nvSpPr>
+          <p:cNvPr id="3" name="Right Brace 2">
+            <a:extLst>
+              <a:ext uri="{FF2B5EF4-FFF2-40B4-BE49-F238E27FC236}">
+                <a16:creationId xmlns:a16="http://schemas.microsoft.com/office/drawing/2014/main" id="{C7F4DE5C-F22F-407E-955F-8C9D81DBB42F}"/>
+              </a:ext>
+            </a:extLst>
+          </p:cNvPr>
+          <p:cNvSpPr/>
+          <p:nvPr/>
+        </p:nvSpPr>
+        <p:spPr>
+          <a:xfrm rot="5400000">
+            <a:off x="5176076" y="528592"/>
+            <a:ext cx="543088" cy="9531804"/>
+          </a:xfrm>
+          <a:prstGeom prst="rightBrace">
+            <a:avLst>
+              <a:gd name="adj1" fmla="val 34641"/>
+              <a:gd name="adj2" fmla="val 50000"/>
+            </a:avLst>
+          </a:prstGeom>
+          <a:ln w="28575">
+            <a:solidFill>
+              <a:schemeClr val="bg1"/>
+            </a:solidFill>
+          </a:ln>
+        </p:spPr>
+        <p:style>
+          <a:lnRef idx="1">
+            <a:schemeClr val="accent1"/>
+          </a:lnRef>
+          <a:fillRef idx="0">
+            <a:schemeClr val="accent1"/>
+          </a:fillRef>
+          <a:effectRef idx="0">
+            <a:schemeClr val="accent1"/>
+          </a:effectRef>
+          <a:fontRef idx="minor">
+            <a:schemeClr val="tx1"/>
+          </a:fontRef>
+        </p:style>
+        <p:txBody>
+          <a:bodyPr rtlCol="0" anchor="ctr"/>
+          <a:lstStyle/>
+          <a:p>
+            <a:pPr algn="ctr"/>
+            <a:endParaRPr lang="en-US"/>
+          </a:p>
+        </p:txBody>
+      </p:sp>
+      <mc:AlternateContent xmlns:mc="http://schemas.openxmlformats.org/markup-compatibility/2006">
+        <mc:Choice xmlns:a14="http://schemas.microsoft.com/office/drawing/2010/main" Requires="a14">
+          <p:sp>
+            <p:nvSpPr>
+              <p:cNvPr id="4" name="TextBox 3">
+                <a:extLst>
+                  <a:ext uri="{FF2B5EF4-FFF2-40B4-BE49-F238E27FC236}">
+                    <a16:creationId xmlns:a16="http://schemas.microsoft.com/office/drawing/2014/main" id="{69E9CA7F-BB00-4AA7-830C-600134759EE3}"/>
+                  </a:ext>
+                </a:extLst>
+              </p:cNvPr>
+              <p:cNvSpPr txBox="1"/>
+              <p:nvPr/>
+            </p:nvSpPr>
+            <p:spPr>
+              <a:xfrm>
+                <a:off x="5200629" y="5566039"/>
+                <a:ext cx="493981" cy="369332"/>
+              </a:xfrm>
+              <a:prstGeom prst="rect">
+                <a:avLst/>
+              </a:prstGeom>
+              <a:noFill/>
+            </p:spPr>
+            <p:txBody>
+              <a:bodyPr wrap="none" rtlCol="0">
+                <a:spAutoFit/>
+              </a:bodyPr>
+              <a:lstStyle/>
+              <a:p>
+                <a14:m>
+                  <m:oMathPara xmlns:m="http://schemas.openxmlformats.org/officeDocument/2006/math">
+                    <m:oMathParaPr>
+                      <m:jc m:val="centerGroup"/>
+                    </m:oMathParaPr>
+                    <m:oMath xmlns:m="http://schemas.openxmlformats.org/officeDocument/2006/math">
+                      <m:r>
+                        <a:rPr lang="en-US" b="0" i="1" smtClean="0">
+                          <a:solidFill>
+                            <a:schemeClr val="bg1"/>
+                          </a:solidFill>
+                          <a:latin typeface="Cambria Math" panose="02040503050406030204" pitchFamily="18" charset="0"/>
+                        </a:rPr>
+                        <m:t>6</m:t>
+                      </m:r>
+                      <m:r>
+                        <a:rPr lang="en-US" b="0" i="1" smtClean="0">
+                          <a:solidFill>
+                            <a:schemeClr val="bg1"/>
+                          </a:solidFill>
+                          <a:latin typeface="Cambria Math" panose="02040503050406030204" pitchFamily="18" charset="0"/>
+                        </a:rPr>
+                        <m:t>𝐿</m:t>
+                      </m:r>
+                    </m:oMath>
+                  </m:oMathPara>
+                </a14:m>
+                <a:endParaRPr lang="en-US" dirty="0">
+                  <a:solidFill>
+                    <a:schemeClr val="bg1"/>
+                  </a:solidFill>
+                </a:endParaRPr>
+              </a:p>
+            </p:txBody>
+          </p:sp>
+        </mc:Choice>
+        <mc:Fallback>
+          <p:sp>
+            <p:nvSpPr>
+              <p:cNvPr id="4" name="TextBox 3">
+                <a:extLst>
+                  <a:ext uri="{FF2B5EF4-FFF2-40B4-BE49-F238E27FC236}">
+                    <a16:creationId xmlns:a16="http://schemas.microsoft.com/office/drawing/2014/main" id="{69E9CA7F-BB00-4AA7-830C-600134759EE3}"/>
+                  </a:ext>
+                </a:extLst>
+              </p:cNvPr>
+              <p:cNvSpPr txBox="1">
+                <a:spLocks noRot="1" noChangeAspect="1" noMove="1" noResize="1" noEditPoints="1" noAdjustHandles="1" noChangeArrowheads="1" noChangeShapeType="1" noTextEdit="1"/>
+              </p:cNvSpPr>
+              <p:nvPr/>
+            </p:nvSpPr>
+            <p:spPr>
+              <a:xfrm>
+                <a:off x="5200629" y="5566039"/>
+                <a:ext cx="493981" cy="369332"/>
+              </a:xfrm>
+              <a:prstGeom prst="rect">
+                <a:avLst/>
+              </a:prstGeom>
+              <a:blipFill>
+                <a:blip r:embed="rId3"/>
+                <a:stretch>
+                  <a:fillRect/>
+                </a:stretch>
+              </a:blipFill>
+            </p:spPr>
+            <p:txBody>
+              <a:bodyPr/>
+              <a:lstStyle/>
+              <a:p>
+                <a:r>
+                  <a:rPr lang="en-US">
+                    <a:noFill/>
+                  </a:rPr>
+                  <a:t> </a:t>
+                </a:r>
+              </a:p>
+            </p:txBody>
+          </p:sp>
+        </mc:Fallback>
+      </mc:AlternateContent>
     </p:spTree>
     <p:extLst>
       <p:ext uri="{BB962C8B-B14F-4D97-AF65-F5344CB8AC3E}">
@@ -17224,8 +17450,8 @@
           </a:p>
         </p:txBody>
       </p:sp>
-      <mc:AlternateContent xmlns:mc="http://schemas.openxmlformats.org/markup-compatibility/2006">
-        <mc:Choice xmlns:a14="http://schemas.microsoft.com/office/drawing/2010/main" Requires="a14">
+      <mc:AlternateContent xmlns:mc="http://schemas.openxmlformats.org/markup-compatibility/2006" xmlns:a14="http://schemas.microsoft.com/office/drawing/2010/main">
+        <mc:Choice Requires="a14">
           <p:sp>
             <p:nvSpPr>
               <p:cNvPr id="3" name="Content Placeholder 2">
@@ -17356,13 +17582,7 @@
                       <a:rPr lang="en-US" b="0" i="1" smtClean="0">
                         <a:latin typeface="Cambria Math" panose="02040503050406030204" pitchFamily="18" charset="0"/>
                       </a:rPr>
-                      <m:t>=</m:t>
-                    </m:r>
-                    <m:r>
-                      <a:rPr lang="en-US" b="0" i="1" smtClean="0">
-                        <a:latin typeface="Cambria Math" panose="02040503050406030204" pitchFamily="18" charset="0"/>
-                      </a:rPr>
-                      <m:t>1.4</m:t>
+                      <m:t>=1.4</m:t>
                     </m:r>
                   </m:oMath>
                 </a14:m>
@@ -17556,7 +17776,7 @@
             </p:txBody>
           </p:sp>
         </mc:Choice>
-        <mc:Fallback>
+        <mc:Fallback xmlns="">
           <p:sp>
             <p:nvSpPr>
               <p:cNvPr id="3" name="Content Placeholder 2">
@@ -17596,8 +17816,8 @@
           </p:sp>
         </mc:Fallback>
       </mc:AlternateContent>
-      <mc:AlternateContent xmlns:mc="http://schemas.openxmlformats.org/markup-compatibility/2006">
-        <mc:Choice xmlns:a14="http://schemas.microsoft.com/office/drawing/2010/main" Requires="a14">
+      <mc:AlternateContent xmlns:mc="http://schemas.openxmlformats.org/markup-compatibility/2006" xmlns:a14="http://schemas.microsoft.com/office/drawing/2010/main">
+        <mc:Choice Requires="a14">
           <p:sp>
             <p:nvSpPr>
               <p:cNvPr id="4" name="Content Placeholder 3">
@@ -17696,13 +17916,7 @@
                       <a:rPr lang="en-US" b="0" i="1" smtClean="0">
                         <a:latin typeface="Cambria Math" panose="02040503050406030204" pitchFamily="18" charset="0"/>
                       </a:rPr>
-                      <m:t>=</m:t>
-                    </m:r>
-                    <m:r>
-                      <a:rPr lang="en-US" b="0" i="1" smtClean="0">
-                        <a:latin typeface="Cambria Math" panose="02040503050406030204" pitchFamily="18" charset="0"/>
-                      </a:rPr>
-                      <m:t>.7053</m:t>
+                      <m:t>=.7053</m:t>
                     </m:r>
                   </m:oMath>
                 </a14:m>
@@ -18157,13 +18371,7 @@
                           <a:rPr lang="en-US" b="0" i="1" smtClean="0">
                             <a:latin typeface="Cambria Math" panose="02040503050406030204" pitchFamily="18" charset="0"/>
                           </a:rPr>
-                          <m:t>0.</m:t>
-                        </m:r>
-                        <m:r>
-                          <a:rPr lang="en-US" b="0" i="1" smtClean="0">
-                            <a:latin typeface="Cambria Math" panose="02040503050406030204" pitchFamily="18" charset="0"/>
-                          </a:rPr>
-                          <m:t>.49745</m:t>
+                          <m:t>0..49745</m:t>
                         </m:r>
                       </m:e>
                     </m:rad>
@@ -18185,13 +18393,7 @@
                       <a:rPr lang="en-US" b="0" i="1" smtClean="0">
                         <a:latin typeface="Cambria Math" panose="02040503050406030204" pitchFamily="18" charset="0"/>
                       </a:rPr>
-                      <m:t>=</m:t>
-                    </m:r>
-                    <m:r>
-                      <a:rPr lang="en-US" b="0" i="1" smtClean="0">
-                        <a:latin typeface="Cambria Math" panose="02040503050406030204" pitchFamily="18" charset="0"/>
-                      </a:rPr>
-                      <m:t>0.9651</m:t>
+                      <m:t>=0.9651</m:t>
                     </m:r>
                   </m:oMath>
                 </a14:m>
@@ -18206,7 +18408,7 @@
             </p:txBody>
           </p:sp>
         </mc:Choice>
-        <mc:Fallback>
+        <mc:Fallback xmlns="">
           <p:sp>
             <p:nvSpPr>
               <p:cNvPr id="4" name="Content Placeholder 3">
@@ -18304,8 +18506,8 @@
           </a:p>
         </p:txBody>
       </p:sp>
-      <mc:AlternateContent xmlns:mc="http://schemas.openxmlformats.org/markup-compatibility/2006">
-        <mc:Choice xmlns:a14="http://schemas.microsoft.com/office/drawing/2010/main" Requires="a14">
+      <mc:AlternateContent xmlns:mc="http://schemas.openxmlformats.org/markup-compatibility/2006" xmlns:a14="http://schemas.microsoft.com/office/drawing/2010/main">
+        <mc:Choice Requires="a14">
           <p:sp>
             <p:nvSpPr>
               <p:cNvPr id="7" name="TextBox 6">
@@ -23161,7 +23363,7 @@
             </p:txBody>
           </p:sp>
         </mc:Choice>
-        <mc:Fallback>
+        <mc:Fallback xmlns="">
           <p:sp>
             <p:nvSpPr>
               <p:cNvPr id="7" name="TextBox 6">
@@ -23264,8 +23466,8 @@
           </a:p>
         </p:txBody>
       </p:sp>
-      <mc:AlternateContent xmlns:mc="http://schemas.openxmlformats.org/markup-compatibility/2006">
-        <mc:Choice xmlns:a14="http://schemas.microsoft.com/office/drawing/2010/main" Requires="a14">
+      <mc:AlternateContent xmlns:mc="http://schemas.openxmlformats.org/markup-compatibility/2006" xmlns:a14="http://schemas.microsoft.com/office/drawing/2010/main">
+        <mc:Choice Requires="a14">
           <p:sp>
             <p:nvSpPr>
               <p:cNvPr id="7" name="TextBox 6">
@@ -26307,7 +26509,7 @@
             </p:txBody>
           </p:sp>
         </mc:Choice>
-        <mc:Fallback>
+        <mc:Fallback xmlns="">
           <p:sp>
             <p:nvSpPr>
               <p:cNvPr id="7" name="TextBox 6">

</xml_diff>